<commit_message>
SLIDESCPP-3640 Fixed review comments
</commit_message>
<xml_diff>
--- a/Showcases/Pptx2VideoConverter/templates/presentation.pptx
+++ b/Showcases/Pptx2VideoConverter/templates/presentation.pptx
@@ -262,7 +262,7 @@
           <a:p>
             <a:fld id="{D6F39CCD-A211-464B-95D1-C514D778B92E}" type="datetimeFigureOut">
               <a:rPr lang="ru-RU" smtClean="0"/>
-              <a:t>29.11.2022</a:t>
+              <a:t>09.02.2023</a:t>
             </a:fld>
             <a:endParaRPr lang="ru-RU"/>
           </a:p>
@@ -460,7 +460,7 @@
           <a:p>
             <a:fld id="{D6F39CCD-A211-464B-95D1-C514D778B92E}" type="datetimeFigureOut">
               <a:rPr lang="ru-RU" smtClean="0"/>
-              <a:t>29.11.2022</a:t>
+              <a:t>09.02.2023</a:t>
             </a:fld>
             <a:endParaRPr lang="ru-RU"/>
           </a:p>
@@ -668,7 +668,7 @@
           <a:p>
             <a:fld id="{D6F39CCD-A211-464B-95D1-C514D778B92E}" type="datetimeFigureOut">
               <a:rPr lang="ru-RU" smtClean="0"/>
-              <a:t>29.11.2022</a:t>
+              <a:t>09.02.2023</a:t>
             </a:fld>
             <a:endParaRPr lang="ru-RU"/>
           </a:p>
@@ -866,7 +866,7 @@
           <a:p>
             <a:fld id="{D6F39CCD-A211-464B-95D1-C514D778B92E}" type="datetimeFigureOut">
               <a:rPr lang="ru-RU" smtClean="0"/>
-              <a:t>29.11.2022</a:t>
+              <a:t>09.02.2023</a:t>
             </a:fld>
             <a:endParaRPr lang="ru-RU"/>
           </a:p>
@@ -1141,7 +1141,7 @@
           <a:p>
             <a:fld id="{D6F39CCD-A211-464B-95D1-C514D778B92E}" type="datetimeFigureOut">
               <a:rPr lang="ru-RU" smtClean="0"/>
-              <a:t>29.11.2022</a:t>
+              <a:t>09.02.2023</a:t>
             </a:fld>
             <a:endParaRPr lang="ru-RU"/>
           </a:p>
@@ -1406,7 +1406,7 @@
           <a:p>
             <a:fld id="{D6F39CCD-A211-464B-95D1-C514D778B92E}" type="datetimeFigureOut">
               <a:rPr lang="ru-RU" smtClean="0"/>
-              <a:t>29.11.2022</a:t>
+              <a:t>09.02.2023</a:t>
             </a:fld>
             <a:endParaRPr lang="ru-RU"/>
           </a:p>
@@ -1818,7 +1818,7 @@
           <a:p>
             <a:fld id="{D6F39CCD-A211-464B-95D1-C514D778B92E}" type="datetimeFigureOut">
               <a:rPr lang="ru-RU" smtClean="0"/>
-              <a:t>29.11.2022</a:t>
+              <a:t>09.02.2023</a:t>
             </a:fld>
             <a:endParaRPr lang="ru-RU"/>
           </a:p>
@@ -1959,7 +1959,7 @@
           <a:p>
             <a:fld id="{D6F39CCD-A211-464B-95D1-C514D778B92E}" type="datetimeFigureOut">
               <a:rPr lang="ru-RU" smtClean="0"/>
-              <a:t>29.11.2022</a:t>
+              <a:t>09.02.2023</a:t>
             </a:fld>
             <a:endParaRPr lang="ru-RU"/>
           </a:p>
@@ -2072,7 +2072,7 @@
           <a:p>
             <a:fld id="{D6F39CCD-A211-464B-95D1-C514D778B92E}" type="datetimeFigureOut">
               <a:rPr lang="ru-RU" smtClean="0"/>
-              <a:t>29.11.2022</a:t>
+              <a:t>09.02.2023</a:t>
             </a:fld>
             <a:endParaRPr lang="ru-RU"/>
           </a:p>
@@ -2383,7 +2383,7 @@
           <a:p>
             <a:fld id="{D6F39CCD-A211-464B-95D1-C514D778B92E}" type="datetimeFigureOut">
               <a:rPr lang="ru-RU" smtClean="0"/>
-              <a:t>29.11.2022</a:t>
+              <a:t>09.02.2023</a:t>
             </a:fld>
             <a:endParaRPr lang="ru-RU"/>
           </a:p>
@@ -2671,7 +2671,7 @@
           <a:p>
             <a:fld id="{D6F39CCD-A211-464B-95D1-C514D778B92E}" type="datetimeFigureOut">
               <a:rPr lang="ru-RU" smtClean="0"/>
-              <a:t>29.11.2022</a:t>
+              <a:t>09.02.2023</a:t>
             </a:fld>
             <a:endParaRPr lang="ru-RU"/>
           </a:p>
@@ -2912,7 +2912,7 @@
           <a:p>
             <a:fld id="{D6F39CCD-A211-464B-95D1-C514D778B92E}" type="datetimeFigureOut">
               <a:rPr lang="ru-RU" smtClean="0"/>
-              <a:t>29.11.2022</a:t>
+              <a:t>09.02.2023</a:t>
             </a:fld>
             <a:endParaRPr lang="ru-RU"/>
           </a:p>
@@ -3555,7 +3555,7 @@
         <p:spPr>
           <a:xfrm>
             <a:off x="2691760" y="914400"/>
-            <a:ext cx="1378006" cy="369332"/>
+            <a:ext cx="800412" cy="369332"/>
           </a:xfrm>
           <a:prstGeom prst="rect">
             <a:avLst/>
@@ -3569,9 +3569,10 @@
           <a:lstStyle/>
           <a:p>
             <a:r>
-              <a:rPr lang="ru-RU" dirty="0"/>
-              <a:t>Выцветание</a:t>
-            </a:r>
+              <a:rPr lang="en-US" dirty="0"/>
+              <a:t>Fading</a:t>
+            </a:r>
+            <a:endParaRPr lang="ru-RU" dirty="0"/>
           </a:p>
         </p:txBody>
       </p:sp>
@@ -3636,7 +3637,7 @@
         <p:spPr>
           <a:xfrm>
             <a:off x="7433233" y="914400"/>
-            <a:ext cx="2011192" cy="369332"/>
+            <a:ext cx="1054584" cy="369332"/>
           </a:xfrm>
           <a:prstGeom prst="rect">
             <a:avLst/>
@@ -3650,9 +3651,10 @@
           <a:lstStyle/>
           <a:p>
             <a:r>
-              <a:rPr lang="ru-RU" dirty="0"/>
-              <a:t>Плавное удаление</a:t>
-            </a:r>
+              <a:rPr lang="en-US" dirty="0"/>
+              <a:t>Float Out</a:t>
+            </a:r>
+            <a:endParaRPr lang="ru-RU" dirty="0"/>
           </a:p>
         </p:txBody>
       </p:sp>
@@ -4000,8 +4002,8 @@
           <a:p>
             <a:pPr algn="ctr"/>
             <a:r>
-              <a:rPr lang="en-US" dirty="0" err="1"/>
-              <a:t>xdvxzdv</a:t>
+              <a:rPr lang="en-US" dirty="0"/>
+              <a:t>Sample Text</a:t>
             </a:r>
             <a:endParaRPr lang="ru-RU" dirty="0"/>
           </a:p>
@@ -4916,6 +4918,10 @@
           <a:lstStyle/>
           <a:p>
             <a:pPr algn="ctr"/>
+            <a:r>
+              <a:rPr lang="en-US"/>
+              <a:t>Wheel</a:t>
+            </a:r>
             <a:endParaRPr lang="ru-RU" dirty="0"/>
           </a:p>
         </p:txBody>
@@ -5208,8 +5214,8 @@
           <a:p>
             <a:pPr algn="ctr"/>
             <a:r>
-              <a:rPr lang="en-US" sz="3200" dirty="0" err="1"/>
-              <a:t>Sfzsffasfs</a:t>
+              <a:rPr lang="en-US" sz="3200" dirty="0"/>
+              <a:t>Shape effect</a:t>
             </a:r>
             <a:endParaRPr lang="ru-RU" sz="3200" dirty="0"/>
           </a:p>
@@ -5261,10 +5267,17 @@
           <a:p>
             <a:pPr algn="ctr"/>
             <a:r>
-              <a:rPr lang="en-US" sz="3200" dirty="0" err="1"/>
-              <a:t>Sfzsffasfs</a:t>
-            </a:r>
-            <a:endParaRPr lang="ru-RU" sz="3200" dirty="0"/>
+              <a:rPr lang="en-US" sz="3200" dirty="0"/>
+              <a:t>Random Bars</a:t>
+            </a:r>
+          </a:p>
+          <a:p>
+            <a:pPr algn="ctr"/>
+            <a:r>
+              <a:rPr lang="en-US" sz="3200"/>
+              <a:t>effect</a:t>
+            </a:r>
+            <a:endParaRPr lang="en-US" sz="3200" dirty="0"/>
           </a:p>
         </p:txBody>
       </p:sp>

</xml_diff>